<commit_message>
updates to developer guide
</commit_message>
<xml_diff>
--- a/docs/diagrams/OpenCommandSequenceDiagram.pptx
+++ b/docs/diagrams/OpenCommandSequenceDiagram.pptx
@@ -259,7 +259,7 @@
           <a:p>
             <a:fld id="{A995DD06-FA5B-3C4A-9EC2-FFA80E37B40D}" type="datetimeFigureOut">
               <a:rPr lang="en-US" smtClean="0"/>
-              <a:t>4/1/2019</a:t>
+              <a:t>4/13/2019</a:t>
             </a:fld>
             <a:endParaRPr lang="en-US"/>
           </a:p>
@@ -457,7 +457,7 @@
           <a:p>
             <a:fld id="{A995DD06-FA5B-3C4A-9EC2-FFA80E37B40D}" type="datetimeFigureOut">
               <a:rPr lang="en-US" smtClean="0"/>
-              <a:t>4/1/2019</a:t>
+              <a:t>4/13/2019</a:t>
             </a:fld>
             <a:endParaRPr lang="en-US"/>
           </a:p>
@@ -665,7 +665,7 @@
           <a:p>
             <a:fld id="{A995DD06-FA5B-3C4A-9EC2-FFA80E37B40D}" type="datetimeFigureOut">
               <a:rPr lang="en-US" smtClean="0"/>
-              <a:t>4/1/2019</a:t>
+              <a:t>4/13/2019</a:t>
             </a:fld>
             <a:endParaRPr lang="en-US"/>
           </a:p>
@@ -863,7 +863,7 @@
           <a:p>
             <a:fld id="{A995DD06-FA5B-3C4A-9EC2-FFA80E37B40D}" type="datetimeFigureOut">
               <a:rPr lang="en-US" smtClean="0"/>
-              <a:t>4/1/2019</a:t>
+              <a:t>4/13/2019</a:t>
             </a:fld>
             <a:endParaRPr lang="en-US"/>
           </a:p>
@@ -1138,7 +1138,7 @@
           <a:p>
             <a:fld id="{A995DD06-FA5B-3C4A-9EC2-FFA80E37B40D}" type="datetimeFigureOut">
               <a:rPr lang="en-US" smtClean="0"/>
-              <a:t>4/1/2019</a:t>
+              <a:t>4/13/2019</a:t>
             </a:fld>
             <a:endParaRPr lang="en-US"/>
           </a:p>
@@ -1403,7 +1403,7 @@
           <a:p>
             <a:fld id="{A995DD06-FA5B-3C4A-9EC2-FFA80E37B40D}" type="datetimeFigureOut">
               <a:rPr lang="en-US" smtClean="0"/>
-              <a:t>4/1/2019</a:t>
+              <a:t>4/13/2019</a:t>
             </a:fld>
             <a:endParaRPr lang="en-US"/>
           </a:p>
@@ -1815,7 +1815,7 @@
           <a:p>
             <a:fld id="{A995DD06-FA5B-3C4A-9EC2-FFA80E37B40D}" type="datetimeFigureOut">
               <a:rPr lang="en-US" smtClean="0"/>
-              <a:t>4/1/2019</a:t>
+              <a:t>4/13/2019</a:t>
             </a:fld>
             <a:endParaRPr lang="en-US"/>
           </a:p>
@@ -1956,7 +1956,7 @@
           <a:p>
             <a:fld id="{A995DD06-FA5B-3C4A-9EC2-FFA80E37B40D}" type="datetimeFigureOut">
               <a:rPr lang="en-US" smtClean="0"/>
-              <a:t>4/1/2019</a:t>
+              <a:t>4/13/2019</a:t>
             </a:fld>
             <a:endParaRPr lang="en-US"/>
           </a:p>
@@ -2069,7 +2069,7 @@
           <a:p>
             <a:fld id="{A995DD06-FA5B-3C4A-9EC2-FFA80E37B40D}" type="datetimeFigureOut">
               <a:rPr lang="en-US" smtClean="0"/>
-              <a:t>4/1/2019</a:t>
+              <a:t>4/13/2019</a:t>
             </a:fld>
             <a:endParaRPr lang="en-US"/>
           </a:p>
@@ -2380,7 +2380,7 @@
           <a:p>
             <a:fld id="{A995DD06-FA5B-3C4A-9EC2-FFA80E37B40D}" type="datetimeFigureOut">
               <a:rPr lang="en-US" smtClean="0"/>
-              <a:t>4/1/2019</a:t>
+              <a:t>4/13/2019</a:t>
             </a:fld>
             <a:endParaRPr lang="en-US"/>
           </a:p>
@@ -2668,7 +2668,7 @@
           <a:p>
             <a:fld id="{A995DD06-FA5B-3C4A-9EC2-FFA80E37B40D}" type="datetimeFigureOut">
               <a:rPr lang="en-US" smtClean="0"/>
-              <a:t>4/1/2019</a:t>
+              <a:t>4/13/2019</a:t>
             </a:fld>
             <a:endParaRPr lang="en-US"/>
           </a:p>
@@ -2909,7 +2909,7 @@
           <a:p>
             <a:fld id="{A995DD06-FA5B-3C4A-9EC2-FFA80E37B40D}" type="datetimeFigureOut">
               <a:rPr lang="en-US" smtClean="0"/>
-              <a:t>4/1/2019</a:t>
+              <a:t>4/13/2019</a:t>
             </a:fld>
             <a:endParaRPr lang="en-US"/>
           </a:p>
@@ -3334,7 +3334,7 @@
         </p:nvSpPr>
         <p:spPr>
           <a:xfrm>
-            <a:off x="6233518" y="243590"/>
+            <a:off x="6241028" y="245763"/>
             <a:ext cx="5860099" cy="6331566"/>
           </a:xfrm>
           <a:prstGeom prst="roundRect">
@@ -3378,7 +3378,7 @@
               </a:rPr>
               <a:t>Model</a:t>
             </a:r>
-            <a:endParaRPr lang="en-SG" sz="1200" b="1" dirty="0">
+            <a:endParaRPr lang="en-SG" sz="1200" b="1">
               <a:solidFill>
                 <a:sysClr val="windowText" lastClr="000000"/>
               </a:solidFill>
@@ -3396,8 +3396,8 @@
         </p:nvCxnSpPr>
         <p:spPr>
           <a:xfrm>
-            <a:off x="6976000" y="2292917"/>
-            <a:ext cx="19230" cy="1771432"/>
+            <a:off x="8055849" y="2282238"/>
+            <a:ext cx="19230" cy="4541535"/>
           </a:xfrm>
           <a:prstGeom prst="line">
             <a:avLst/>
@@ -3473,14 +3473,14 @@
           <a:lstStyle/>
           <a:p>
             <a:r>
-              <a:rPr lang="en-US" sz="1200" b="1" dirty="0">
+              <a:rPr lang="en-US" sz="1200" b="1">
                 <a:solidFill>
                   <a:srgbClr val="0070C0"/>
                 </a:solidFill>
               </a:rPr>
               <a:t>Logic</a:t>
             </a:r>
-            <a:endParaRPr lang="en-SG" sz="1200" b="1" dirty="0">
+            <a:endParaRPr lang="en-SG" sz="1200" b="1">
               <a:solidFill>
                 <a:srgbClr val="0070C0"/>
               </a:solidFill>
@@ -3532,7 +3532,7 @@
           <a:p>
             <a:pPr algn="ctr"/>
             <a:r>
-              <a:rPr lang="en-US" sz="1600" dirty="0">
+              <a:rPr lang="en-US" sz="1600">
                 <a:solidFill>
                   <a:schemeClr val="bg1"/>
                 </a:solidFill>
@@ -3540,14 +3540,14 @@
               <a:t>:</a:t>
             </a:r>
             <a:r>
-              <a:rPr lang="en-US" sz="1600" dirty="0" err="1">
+              <a:rPr lang="en-US" sz="1600" err="1">
                 <a:solidFill>
                   <a:schemeClr val="bg1"/>
                 </a:solidFill>
               </a:rPr>
               <a:t>LogicManager</a:t>
             </a:r>
-            <a:endParaRPr lang="en-SG" sz="1600" dirty="0">
+            <a:endParaRPr lang="en-SG" sz="1600">
               <a:solidFill>
                 <a:schemeClr val="bg1"/>
               </a:solidFill>
@@ -3652,7 +3652,7 @@
         </p:nvCxnSpPr>
         <p:spPr>
           <a:xfrm>
-            <a:off x="5470417" y="2118953"/>
+            <a:off x="5490391" y="2291895"/>
             <a:ext cx="0" cy="4098081"/>
           </a:xfrm>
           <a:prstGeom prst="line">
@@ -3790,7 +3790,7 @@
           <a:p>
             <a:pPr algn="ctr"/>
             <a:r>
-              <a:rPr lang="en-US" sz="1400" dirty="0">
+              <a:rPr lang="en-US" sz="1400">
                 <a:solidFill>
                   <a:srgbClr val="0070C0"/>
                 </a:solidFill>
@@ -3808,11 +3808,6 @@
               </a:rPr>
               <a:t>(“open &lt;args&gt;”)</a:t>
             </a:r>
-            <a:endParaRPr lang="en-US" sz="1400" dirty="0">
-              <a:solidFill>
-                <a:srgbClr val="0070C0"/>
-              </a:solidFill>
-            </a:endParaRPr>
           </a:p>
         </p:txBody>
       </p:sp>
@@ -3888,7 +3883,7 @@
           </a:lstStyle>
           <a:p>
             <a:r>
-              <a:rPr lang="en-US" dirty="0"/>
+              <a:rPr lang="en-US"/>
               <a:t>execute()</a:t>
             </a:r>
           </a:p>
@@ -3983,7 +3978,7 @@
         <p:spPr>
           <a:xfrm>
             <a:off x="5394823" y="2633836"/>
-            <a:ext cx="159081" cy="3477385"/>
+            <a:ext cx="159081" cy="3614560"/>
           </a:xfrm>
           <a:prstGeom prst="rect">
             <a:avLst/>
@@ -4029,8 +4024,8 @@
         </p:nvSpPr>
         <p:spPr>
           <a:xfrm>
-            <a:off x="5281645" y="2551752"/>
-            <a:ext cx="1423782" cy="184666"/>
+            <a:off x="5638873" y="2524667"/>
+            <a:ext cx="2039889" cy="184666"/>
           </a:xfrm>
           <a:prstGeom prst="rect">
             <a:avLst/>
@@ -4062,15 +4057,8 @@
                   </a:schemeClr>
                 </a:solidFill>
               </a:rPr>
-              <a:t>checkFileExists()</a:t>
-            </a:r>
-            <a:endParaRPr lang="en-US" sz="1200" dirty="0">
-              <a:solidFill>
-                <a:schemeClr val="accent2">
-                  <a:lumMod val="75000"/>
-                </a:schemeClr>
-              </a:solidFill>
-            </a:endParaRPr>
+              <a:t>checkFileExists(“sample.png”)</a:t>
+            </a:r>
           </a:p>
         </p:txBody>
       </p:sp>
@@ -4082,7 +4070,7 @@
         </p:nvSpPr>
         <p:spPr>
           <a:xfrm>
-            <a:off x="3141090" y="5861283"/>
+            <a:off x="3141090" y="5988283"/>
             <a:ext cx="621216" cy="215444"/>
           </a:xfrm>
           <a:prstGeom prst="rect">
@@ -4108,7 +4096,7 @@
           </a:lstStyle>
           <a:p>
             <a:r>
-              <a:rPr lang="en-US" dirty="0"/>
+              <a:rPr lang="en-US"/>
               <a:t>result</a:t>
             </a:r>
           </a:p>
@@ -4148,7 +4136,7 @@
           </a:lstStyle>
           <a:p>
             <a:r>
-              <a:rPr lang="en-US" dirty="0"/>
+              <a:rPr lang="en-US"/>
               <a:t>result</a:t>
             </a:r>
           </a:p>
@@ -4162,8 +4150,8 @@
         </p:nvSpPr>
         <p:spPr>
           <a:xfrm>
-            <a:off x="1960027" y="2063529"/>
-            <a:ext cx="1569928" cy="215444"/>
+            <a:off x="1595747" y="2053189"/>
+            <a:ext cx="2250140" cy="184666"/>
           </a:xfrm>
           <a:prstGeom prst="rect">
             <a:avLst/>
@@ -4189,10 +4177,13 @@
           <a:p>
             <a:pPr algn="ctr"/>
             <a:r>
-              <a:rPr lang="en-US"/>
+              <a:rPr lang="en-US" sz="1200" err="1"/>
               <a:t>OpenCommand</a:t>
             </a:r>
-            <a:endParaRPr lang="en-US" dirty="0"/>
+            <a:r>
+              <a:rPr lang="en-US" sz="1200"/>
+              <a:t>(“sample.png”)</a:t>
+            </a:r>
           </a:p>
         </p:txBody>
       </p:sp>
@@ -4204,7 +4195,7 @@
         </p:nvSpPr>
         <p:spPr>
           <a:xfrm>
-            <a:off x="6325370" y="1898861"/>
+            <a:off x="7405219" y="1888182"/>
             <a:ext cx="1388493" cy="394056"/>
           </a:xfrm>
           <a:prstGeom prst="rect">
@@ -4255,7 +4246,7 @@
               </a:rPr>
               <a:t>:Album</a:t>
             </a:r>
-            <a:endParaRPr lang="en-SG" sz="1600" dirty="0">
+            <a:endParaRPr lang="en-SG" sz="1600">
               <a:solidFill>
                 <a:schemeClr val="accent2">
                   <a:lumMod val="75000"/>
@@ -4274,9 +4265,9 @@
           <p:nvPr/>
         </p:nvCxnSpPr>
         <p:spPr>
-          <a:xfrm>
-            <a:off x="5546617" y="2741149"/>
-            <a:ext cx="1352411" cy="1"/>
+          <a:xfrm flipV="1">
+            <a:off x="5546617" y="2730471"/>
+            <a:ext cx="2404543" cy="10680"/>
           </a:xfrm>
           <a:prstGeom prst="straightConnector1">
             <a:avLst/>
@@ -4311,7 +4302,7 @@
         </p:nvSpPr>
         <p:spPr>
           <a:xfrm>
-            <a:off x="5341215" y="6217034"/>
+            <a:off x="5361189" y="6389976"/>
             <a:ext cx="258404" cy="261610"/>
           </a:xfrm>
           <a:prstGeom prst="rect">
@@ -4326,7 +4317,7 @@
           <a:lstStyle/>
           <a:p>
             <a:r>
-              <a:rPr lang="en-SG" sz="1100" dirty="0">
+              <a:rPr lang="en-SG" sz="1100">
                 <a:solidFill>
                   <a:srgbClr val="002060"/>
                 </a:solidFill>
@@ -4388,21 +4379,21 @@
               <a:t>open: ListFiles</a:t>
             </a:r>
             <a:br>
-              <a:rPr lang="en-US" sz="1400" dirty="0">
+              <a:rPr lang="en-US" sz="1400">
                 <a:solidFill>
                   <a:schemeClr val="bg1"/>
                 </a:solidFill>
               </a:rPr>
             </a:br>
             <a:r>
-              <a:rPr lang="en-US" sz="1400" dirty="0">
+              <a:rPr lang="en-US" sz="1400">
                 <a:solidFill>
                   <a:schemeClr val="bg1"/>
                 </a:solidFill>
               </a:rPr>
               <a:t>Command</a:t>
             </a:r>
-            <a:endParaRPr lang="en-SG" sz="1400" dirty="0">
+            <a:endParaRPr lang="en-SG" sz="1400">
               <a:solidFill>
                 <a:schemeClr val="bg1"/>
               </a:solidFill>
@@ -4470,7 +4461,7 @@
         </p:nvCxnSpPr>
         <p:spPr>
           <a:xfrm>
-            <a:off x="1559687" y="6109729"/>
+            <a:off x="1559687" y="6236729"/>
             <a:ext cx="3831517" cy="0"/>
           </a:xfrm>
           <a:prstGeom prst="straightConnector1">
@@ -4516,8 +4507,8 @@
         </p:nvCxnSpPr>
         <p:spPr>
           <a:xfrm flipV="1">
-            <a:off x="5567522" y="3844908"/>
-            <a:ext cx="1335785" cy="6888"/>
+            <a:off x="5567522" y="3857892"/>
+            <a:ext cx="2383638" cy="4149"/>
           </a:xfrm>
           <a:prstGeom prst="straightConnector1">
             <a:avLst/>
@@ -4548,47 +4539,6 @@
           </a:fontRef>
         </p:style>
       </p:cxnSp>
-      <p:sp>
-        <p:nvSpPr>
-          <p:cNvPr id="78" name="TextBox 77">
-            <a:extLst>
-              <a:ext uri="{FF2B5EF4-FFF2-40B4-BE49-F238E27FC236}">
-                <a16:creationId xmlns:a16="http://schemas.microsoft.com/office/drawing/2014/main" id="{0772AC28-6CCA-D043-ABB2-97A18FBB6317}"/>
-              </a:ext>
-            </a:extLst>
-          </p:cNvPr>
-          <p:cNvSpPr txBox="1"/>
-          <p:nvPr/>
-        </p:nvSpPr>
-        <p:spPr>
-          <a:xfrm>
-            <a:off x="6863442" y="4004979"/>
-            <a:ext cx="258404" cy="261610"/>
-          </a:xfrm>
-          <a:prstGeom prst="rect">
-            <a:avLst/>
-          </a:prstGeom>
-          <a:noFill/>
-        </p:spPr>
-        <p:txBody>
-          <a:bodyPr wrap="square" rtlCol="0">
-            <a:spAutoFit/>
-          </a:bodyPr>
-          <a:lstStyle/>
-          <a:p>
-            <a:r>
-              <a:rPr lang="en-SG" sz="1100" dirty="0">
-                <a:solidFill>
-                  <a:schemeClr val="accent2">
-                    <a:lumMod val="75000"/>
-                  </a:schemeClr>
-                </a:solidFill>
-              </a:rPr>
-              <a:t>X</a:t>
-            </a:r>
-          </a:p>
-        </p:txBody>
-      </p:sp>
       <p:sp>
         <p:nvSpPr>
           <p:cNvPr id="39" name="Rectangle 62">
@@ -4639,7 +4589,7 @@
           <a:p>
             <a:pPr algn="ctr"/>
             <a:r>
-              <a:rPr lang="en-US" sz="1600" dirty="0">
+              <a:rPr lang="en-US" sz="1600">
                 <a:solidFill>
                   <a:schemeClr val="bg1"/>
                 </a:solidFill>
@@ -4647,14 +4597,14 @@
               <a:t>:</a:t>
             </a:r>
             <a:r>
-              <a:rPr lang="en-US" sz="1600" dirty="0" err="1">
+              <a:rPr lang="en-US" sz="1600" err="1">
                 <a:solidFill>
                   <a:schemeClr val="bg1"/>
                 </a:solidFill>
               </a:rPr>
               <a:t>FomoFotoParser</a:t>
             </a:r>
-            <a:endParaRPr lang="en-SG" sz="1600" dirty="0">
+            <a:endParaRPr lang="en-SG" sz="1600">
               <a:solidFill>
                 <a:schemeClr val="bg1"/>
               </a:solidFill>
@@ -4709,7 +4659,6 @@
               <a:rPr lang="en-US"/>
               <a:t>(“open”)</a:t>
             </a:r>
-            <a:endParaRPr lang="en-US" dirty="0"/>
           </a:p>
         </p:txBody>
       </p:sp>
@@ -4916,7 +4865,7 @@
         <p:spPr>
           <a:xfrm>
             <a:off x="4181667" y="2989925"/>
-            <a:ext cx="7715683" cy="2978943"/>
+            <a:ext cx="7715683" cy="3136553"/>
           </a:xfrm>
           <a:prstGeom prst="rect">
             <a:avLst/>
@@ -4982,10 +4931,10 @@
           <a:lstStyle/>
           <a:p>
             <a:r>
-              <a:rPr lang="en-SG" sz="1100" dirty="0"/>
+              <a:rPr lang="en-SG" sz="1100"/>
               <a:t>opt</a:t>
             </a:r>
-            <a:endParaRPr lang="en-SG" sz="1200" dirty="0"/>
+            <a:endParaRPr lang="en-SG" sz="1200"/>
           </a:p>
         </p:txBody>
       </p:sp>
@@ -5037,11 +4986,6 @@
               </a:rPr>
               <a:t>[file exists]</a:t>
             </a:r>
-            <a:endParaRPr lang="en-US" sz="1200" dirty="0">
-              <a:solidFill>
-                <a:schemeClr val="tx1"/>
-              </a:solidFill>
-            </a:endParaRPr>
           </a:p>
         </p:txBody>
       </p:sp>
@@ -5061,8 +5005,8 @@
         </p:nvCxnSpPr>
         <p:spPr>
           <a:xfrm flipV="1">
-            <a:off x="5559902" y="2885303"/>
-            <a:ext cx="1335785" cy="6888"/>
+            <a:off x="5559902" y="2885140"/>
+            <a:ext cx="2418975" cy="7051"/>
           </a:xfrm>
           <a:prstGeom prst="straightConnector1">
             <a:avLst/>
@@ -5107,8 +5051,8 @@
         </p:nvSpPr>
         <p:spPr>
           <a:xfrm>
-            <a:off x="5226162" y="3146182"/>
-            <a:ext cx="1423782" cy="184666"/>
+            <a:off x="5635044" y="3105349"/>
+            <a:ext cx="2008504" cy="184666"/>
           </a:xfrm>
           <a:prstGeom prst="rect">
             <a:avLst/>
@@ -5140,15 +5084,8 @@
                   </a:schemeClr>
                 </a:solidFill>
               </a:rPr>
-              <a:t>retrieveImage()</a:t>
-            </a:r>
-            <a:endParaRPr lang="en-US" sz="1200" dirty="0">
-              <a:solidFill>
-                <a:schemeClr val="accent2">
-                  <a:lumMod val="75000"/>
-                </a:schemeClr>
-              </a:solidFill>
-            </a:endParaRPr>
+              <a:t>retrieveImage(“sample.png”)</a:t>
+            </a:r>
           </a:p>
         </p:txBody>
       </p:sp>
@@ -5167,9 +5104,9 @@
           <p:nvPr/>
         </p:nvCxnSpPr>
         <p:spPr>
-          <a:xfrm>
-            <a:off x="5491134" y="3335579"/>
-            <a:ext cx="1390088" cy="5757"/>
+          <a:xfrm flipV="1">
+            <a:off x="5491134" y="3323720"/>
+            <a:ext cx="2477149" cy="11859"/>
           </a:xfrm>
           <a:prstGeom prst="straightConnector1">
             <a:avLst/>
@@ -5210,7 +5147,7 @@
         </p:nvSpPr>
         <p:spPr>
           <a:xfrm>
-            <a:off x="5216757" y="4078376"/>
+            <a:off x="6113833" y="4072357"/>
             <a:ext cx="1423782" cy="184666"/>
           </a:xfrm>
           <a:prstGeom prst="rect">
@@ -5241,13 +5178,8 @@
                   <a:srgbClr val="7030A0"/>
                 </a:solidFill>
               </a:rPr>
-              <a:t>openImage()</a:t>
-            </a:r>
-            <a:endParaRPr lang="en-US" sz="1200" dirty="0">
-              <a:solidFill>
-                <a:srgbClr val="7030A0"/>
-              </a:solidFill>
-            </a:endParaRPr>
+              <a:t>openImage(Image)</a:t>
+            </a:r>
           </a:p>
         </p:txBody>
       </p:sp>
@@ -5352,7 +5284,7 @@
               </a:rPr>
               <a:t>:CurrentEdit</a:t>
             </a:r>
-            <a:endParaRPr lang="en-SG" sz="1600" dirty="0">
+            <a:endParaRPr lang="en-SG" sz="1600">
               <a:solidFill>
                 <a:schemeClr val="bg1"/>
               </a:solidFill>
@@ -5472,7 +5404,7 @@
         </p:nvSpPr>
         <p:spPr>
           <a:xfrm>
-            <a:off x="5212821" y="4705728"/>
+            <a:off x="5835581" y="4696622"/>
             <a:ext cx="1423782" cy="184666"/>
           </a:xfrm>
           <a:prstGeom prst="rect">
@@ -5505,11 +5437,6 @@
               </a:rPr>
               <a:t>updateExif()</a:t>
             </a:r>
-            <a:endParaRPr lang="en-US" sz="1200" dirty="0">
-              <a:solidFill>
-                <a:srgbClr val="7030A0"/>
-              </a:solidFill>
-            </a:endParaRPr>
           </a:p>
         </p:txBody>
       </p:sp>
@@ -5571,7 +5498,7 @@
         </p:nvSpPr>
         <p:spPr>
           <a:xfrm>
-            <a:off x="5342361" y="5340359"/>
+            <a:off x="6024656" y="5306633"/>
             <a:ext cx="1423782" cy="184666"/>
           </a:xfrm>
           <a:prstGeom prst="rect">
@@ -5604,11 +5531,6 @@
               </a:rPr>
               <a:t>displayTempImg()</a:t>
             </a:r>
-            <a:endParaRPr lang="en-US" sz="1200" dirty="0">
-              <a:solidFill>
-                <a:srgbClr val="7030A0"/>
-              </a:solidFill>
-            </a:endParaRPr>
           </a:p>
         </p:txBody>
       </p:sp>
@@ -5759,13 +5681,12 @@
           </p:cNvPr>
           <p:cNvCxnSpPr>
             <a:cxnSpLocks/>
-            <a:endCxn id="72" idx="2"/>
           </p:cNvCxnSpPr>
           <p:nvPr/>
         </p:nvCxnSpPr>
         <p:spPr>
           <a:xfrm>
-            <a:off x="5559902" y="5765382"/>
+            <a:off x="5559902" y="5988902"/>
             <a:ext cx="3890116" cy="0"/>
           </a:xfrm>
           <a:prstGeom prst="straightConnector1">
@@ -5813,7 +5734,7 @@
         <p:spPr>
           <a:xfrm>
             <a:off x="11091833" y="3335579"/>
-            <a:ext cx="15691" cy="2429803"/>
+            <a:ext cx="19230" cy="3498586"/>
           </a:xfrm>
           <a:prstGeom prst="line">
             <a:avLst/>
@@ -5855,7 +5776,7 @@
         </p:nvSpPr>
         <p:spPr>
           <a:xfrm>
-            <a:off x="9656183" y="4797461"/>
+            <a:off x="9656183" y="4843181"/>
             <a:ext cx="1243907" cy="738664"/>
           </a:xfrm>
           <a:prstGeom prst="rect">
@@ -5885,7 +5806,7 @@
           <a:p>
             <a:pPr algn="ctr"/>
             <a:r>
-              <a:rPr lang="en-US" sz="1200" dirty="0">
+              <a:rPr lang="en-US" sz="1200">
                 <a:solidFill>
                   <a:srgbClr val="7030A0"/>
                 </a:solidFill>
@@ -5896,7 +5817,7 @@
           <a:p>
             <a:pPr algn="ctr"/>
             <a:r>
-              <a:rPr lang="en-US" sz="1200" dirty="0" err="1">
+              <a:rPr lang="en-US" sz="1200" err="1">
                 <a:solidFill>
                   <a:srgbClr val="7030A0"/>
                 </a:solidFill>
@@ -5904,7 +5825,7 @@
               <a:t>firePropertyChangeListener</a:t>
             </a:r>
             <a:r>
-              <a:rPr lang="en-US" sz="1200" dirty="0">
+              <a:rPr lang="en-US" sz="1200">
                 <a:solidFill>
                   <a:srgbClr val="7030A0"/>
                 </a:solidFill>
@@ -5930,7 +5851,7 @@
         </p:nvCxnSpPr>
         <p:spPr>
           <a:xfrm flipV="1">
-            <a:off x="9554573" y="5557101"/>
+            <a:off x="9554573" y="5602821"/>
             <a:ext cx="1473043" cy="5064"/>
           </a:xfrm>
           <a:prstGeom prst="straightConnector1">
@@ -5974,7 +5895,7 @@
         </p:nvCxnSpPr>
         <p:spPr>
           <a:xfrm flipV="1">
-            <a:off x="9554573" y="5694334"/>
+            <a:off x="9554573" y="5740054"/>
             <a:ext cx="1488215" cy="10121"/>
           </a:xfrm>
           <a:prstGeom prst="straightConnector1">
@@ -6018,8 +5939,8 @@
         </p:nvSpPr>
         <p:spPr>
           <a:xfrm>
-            <a:off x="9345463" y="5508328"/>
-            <a:ext cx="209110" cy="257054"/>
+            <a:off x="9342986" y="5512738"/>
+            <a:ext cx="209110" cy="480625"/>
           </a:xfrm>
           <a:prstGeom prst="rect">
             <a:avLst/>
@@ -6114,7 +6035,7 @@
               </a:rPr>
               <a:t>:Notifier</a:t>
             </a:r>
-            <a:endParaRPr lang="en-SG" sz="1600" dirty="0">
+            <a:endParaRPr lang="en-SG" sz="1600">
               <a:solidFill>
                 <a:schemeClr val="bg1"/>
               </a:solidFill>
@@ -6177,45 +6098,6 @@
       </p:sp>
       <p:sp>
         <p:nvSpPr>
-          <p:cNvPr id="86" name="TextBox 85">
-            <a:extLst>
-              <a:ext uri="{FF2B5EF4-FFF2-40B4-BE49-F238E27FC236}">
-                <a16:creationId xmlns:a16="http://schemas.microsoft.com/office/drawing/2014/main" id="{BC6C426F-4F3C-4BA1-9901-81613E7B8B26}"/>
-              </a:ext>
-            </a:extLst>
-          </p:cNvPr>
-          <p:cNvSpPr txBox="1"/>
-          <p:nvPr/>
-        </p:nvSpPr>
-        <p:spPr>
-          <a:xfrm>
-            <a:off x="10978322" y="5683350"/>
-            <a:ext cx="258404" cy="261610"/>
-          </a:xfrm>
-          <a:prstGeom prst="rect">
-            <a:avLst/>
-          </a:prstGeom>
-          <a:noFill/>
-        </p:spPr>
-        <p:txBody>
-          <a:bodyPr wrap="square" rtlCol="0">
-            <a:spAutoFit/>
-          </a:bodyPr>
-          <a:lstStyle/>
-          <a:p>
-            <a:r>
-              <a:rPr lang="en-SG" sz="1100" dirty="0">
-                <a:solidFill>
-                  <a:srgbClr val="002060"/>
-                </a:solidFill>
-              </a:rPr>
-              <a:t>X</a:t>
-            </a:r>
-          </a:p>
-        </p:txBody>
-      </p:sp>
-      <p:sp>
-        <p:nvSpPr>
           <p:cNvPr id="87" name="Rectangle 86">
             <a:extLst>
               <a:ext uri="{FF2B5EF4-FFF2-40B4-BE49-F238E27FC236}">
@@ -6228,8 +6110,8 @@
         </p:nvSpPr>
         <p:spPr>
           <a:xfrm>
-            <a:off x="6899028" y="3350327"/>
-            <a:ext cx="210645" cy="494580"/>
+            <a:off x="7961711" y="3323898"/>
+            <a:ext cx="210645" cy="538143"/>
           </a:xfrm>
           <a:prstGeom prst="rect">
             <a:avLst/>
@@ -6287,7 +6169,7 @@
         </p:nvSpPr>
         <p:spPr>
           <a:xfrm>
-            <a:off x="6903306" y="2741150"/>
+            <a:off x="7961711" y="2732103"/>
             <a:ext cx="210645" cy="151042"/>
           </a:xfrm>
           <a:prstGeom prst="rect">

</xml_diff>